<commit_message>
Added business case in .pdf
</commit_message>
<xml_diff>
--- a/Presentation/Business Case.pptx
+++ b/Presentation/Business Case.pptx
@@ -139,7 +139,7 @@
 <p1510:revInfo xmlns:a="http://schemas.openxmlformats.org/drawingml/2006/main" xmlns:r="http://schemas.openxmlformats.org/officeDocument/2006/relationships" xmlns:p1510="http://schemas.microsoft.com/office/powerpoint/2015/10/main">
   <p1510:revLst>
     <p1510:client id="{6C07D6A3-EBF5-4FB2-8DA2-E7C20B9441F0}" v="1060" dt="2021-01-02T22:26:43.754"/>
-    <p1510:client id="{BD5E4151-9021-455A-904C-FCA0A1131E6C}" v="6970" dt="2021-01-03T15:37:57.904"/>
+    <p1510:client id="{BD5E4151-9021-455A-904C-FCA0A1131E6C}" v="7027" dt="2021-01-03T19:55:39.722"/>
   </p1510:revLst>
 </p1510:revInfo>
 </file>
@@ -3861,6 +3861,36 @@
           </a:p>
         </p:txBody>
       </p:sp>
+      <p:pic>
+        <p:nvPicPr>
+          <p:cNvPr id="7" name="Imagen 6" descr="Icono&#10;&#10;Descripción generada automáticamente">
+            <a:extLst>
+              <a:ext uri="{FF2B5EF4-FFF2-40B4-BE49-F238E27FC236}">
+                <a16:creationId xmlns:a16="http://schemas.microsoft.com/office/drawing/2014/main" id="{9A888DFC-16F1-49B1-8FED-D4338DCB930C}"/>
+              </a:ext>
+            </a:extLst>
+          </p:cNvPr>
+          <p:cNvPicPr>
+            <a:picLocks noChangeAspect="1"/>
+          </p:cNvPicPr>
+          <p:nvPr/>
+        </p:nvPicPr>
+        <p:blipFill>
+          <a:blip r:embed="rId2"/>
+          <a:stretch>
+            <a:fillRect/>
+          </a:stretch>
+        </p:blipFill>
+        <p:spPr>
+          <a:xfrm>
+            <a:off x="11379438" y="65025"/>
+            <a:ext cx="745274" cy="733748"/>
+          </a:xfrm>
+          <a:prstGeom prst="rect">
+            <a:avLst/>
+          </a:prstGeom>
+        </p:spPr>
+      </p:pic>
     </p:spTree>
     <p:extLst>
       <p:ext uri="{BB962C8B-B14F-4D97-AF65-F5344CB8AC3E}">
@@ -4941,7 +4971,7 @@
           <a:p>
             <a:r>
               <a:rPr lang="es-ES"/>
-              <a:t>As seen from the ribbon chart below, both Activision and Electronic Arts have performed consistentlyand well in the past few years. Making them both very valuable choices. </a:t>
+              <a:t>As seen from the ribbon chart below, both Activision and Electronic Arts have performed consistently and well in the past few years. Making them both very valuable choices. </a:t>
             </a:r>
           </a:p>
         </p:txBody>

</xml_diff>